<commit_message>
'Thank You' slide 삽입
.
</commit_message>
<xml_diff>
--- a/week12/branch.pptx
+++ b/week12/branch.pptx
@@ -7,6 +7,7 @@
   <p:sldIdLst>
     <p:sldId id="256" r:id="rId2"/>
     <p:sldId id="257" r:id="rId3"/>
+    <p:sldId id="258" r:id="rId4"/>
   </p:sldIdLst>
   <p:sldSz cx="12192000" cy="6858000"/>
   <p:notesSz cx="6858000" cy="9144000"/>
@@ -262,7 +263,7 @@
           <a:p>
             <a:fld id="{42AB81E2-2E7B-B344-9159-A676E4F74E42}" type="datetimeFigureOut">
               <a:rPr lang="en-KR" smtClean="0"/>
-              <a:t>11/16/23</a:t>
+              <a:t>11/17/2023</a:t>
             </a:fld>
             <a:endParaRPr lang="en-KR"/>
           </a:p>
@@ -462,7 +463,7 @@
           <a:p>
             <a:fld id="{42AB81E2-2E7B-B344-9159-A676E4F74E42}" type="datetimeFigureOut">
               <a:rPr lang="en-KR" smtClean="0"/>
-              <a:t>11/16/23</a:t>
+              <a:t>11/17/2023</a:t>
             </a:fld>
             <a:endParaRPr lang="en-KR"/>
           </a:p>
@@ -672,7 +673,7 @@
           <a:p>
             <a:fld id="{42AB81E2-2E7B-B344-9159-A676E4F74E42}" type="datetimeFigureOut">
               <a:rPr lang="en-KR" smtClean="0"/>
-              <a:t>11/16/23</a:t>
+              <a:t>11/17/2023</a:t>
             </a:fld>
             <a:endParaRPr lang="en-KR"/>
           </a:p>
@@ -872,7 +873,7 @@
           <a:p>
             <a:fld id="{42AB81E2-2E7B-B344-9159-A676E4F74E42}" type="datetimeFigureOut">
               <a:rPr lang="en-KR" smtClean="0"/>
-              <a:t>11/16/23</a:t>
+              <a:t>11/17/2023</a:t>
             </a:fld>
             <a:endParaRPr lang="en-KR"/>
           </a:p>
@@ -1148,7 +1149,7 @@
           <a:p>
             <a:fld id="{42AB81E2-2E7B-B344-9159-A676E4F74E42}" type="datetimeFigureOut">
               <a:rPr lang="en-KR" smtClean="0"/>
-              <a:t>11/16/23</a:t>
+              <a:t>11/17/2023</a:t>
             </a:fld>
             <a:endParaRPr lang="en-KR"/>
           </a:p>
@@ -1416,7 +1417,7 @@
           <a:p>
             <a:fld id="{42AB81E2-2E7B-B344-9159-A676E4F74E42}" type="datetimeFigureOut">
               <a:rPr lang="en-KR" smtClean="0"/>
-              <a:t>11/16/23</a:t>
+              <a:t>11/17/2023</a:t>
             </a:fld>
             <a:endParaRPr lang="en-KR"/>
           </a:p>
@@ -1831,7 +1832,7 @@
           <a:p>
             <a:fld id="{42AB81E2-2E7B-B344-9159-A676E4F74E42}" type="datetimeFigureOut">
               <a:rPr lang="en-KR" smtClean="0"/>
-              <a:t>11/16/23</a:t>
+              <a:t>11/17/2023</a:t>
             </a:fld>
             <a:endParaRPr lang="en-KR"/>
           </a:p>
@@ -1973,7 +1974,7 @@
           <a:p>
             <a:fld id="{42AB81E2-2E7B-B344-9159-A676E4F74E42}" type="datetimeFigureOut">
               <a:rPr lang="en-KR" smtClean="0"/>
-              <a:t>11/16/23</a:t>
+              <a:t>11/17/2023</a:t>
             </a:fld>
             <a:endParaRPr lang="en-KR"/>
           </a:p>
@@ -2086,7 +2087,7 @@
           <a:p>
             <a:fld id="{42AB81E2-2E7B-B344-9159-A676E4F74E42}" type="datetimeFigureOut">
               <a:rPr lang="en-KR" smtClean="0"/>
-              <a:t>11/16/23</a:t>
+              <a:t>11/17/2023</a:t>
             </a:fld>
             <a:endParaRPr lang="en-KR"/>
           </a:p>
@@ -2399,7 +2400,7 @@
           <a:p>
             <a:fld id="{42AB81E2-2E7B-B344-9159-A676E4F74E42}" type="datetimeFigureOut">
               <a:rPr lang="en-KR" smtClean="0"/>
-              <a:t>11/16/23</a:t>
+              <a:t>11/17/2023</a:t>
             </a:fld>
             <a:endParaRPr lang="en-KR"/>
           </a:p>
@@ -2688,7 +2689,7 @@
           <a:p>
             <a:fld id="{42AB81E2-2E7B-B344-9159-A676E4F74E42}" type="datetimeFigureOut">
               <a:rPr lang="en-KR" smtClean="0"/>
-              <a:t>11/16/23</a:t>
+              <a:t>11/17/2023</a:t>
             </a:fld>
             <a:endParaRPr lang="en-KR"/>
           </a:p>
@@ -2931,7 +2932,7 @@
           <a:p>
             <a:fld id="{42AB81E2-2E7B-B344-9159-A676E4F74E42}" type="datetimeFigureOut">
               <a:rPr lang="en-KR" smtClean="0"/>
-              <a:t>11/16/23</a:t>
+              <a:t>11/17/2023</a:t>
             </a:fld>
             <a:endParaRPr lang="en-KR"/>
           </a:p>
@@ -3802,6 +3803,70 @@
 </p:sld>
 </file>
 
+<file path=ppt/slides/slide3.xml><?xml version="1.0" encoding="utf-8"?>
+<p:sld xmlns:a="http://schemas.openxmlformats.org/drawingml/2006/main" xmlns:r="http://schemas.openxmlformats.org/officeDocument/2006/relationships" xmlns:p="http://schemas.openxmlformats.org/presentationml/2006/main">
+  <p:cSld>
+    <p:spTree>
+      <p:nvGrpSpPr>
+        <p:cNvPr id="1" name=""/>
+        <p:cNvGrpSpPr/>
+        <p:nvPr/>
+      </p:nvGrpSpPr>
+      <p:grpSpPr>
+        <a:xfrm>
+          <a:off x="0" y="0"/>
+          <a:ext cx="0" cy="0"/>
+          <a:chOff x="0" y="0"/>
+          <a:chExt cx="0" cy="0"/>
+        </a:xfrm>
+      </p:grpSpPr>
+      <p:sp>
+        <p:nvSpPr>
+          <p:cNvPr id="6" name="제목 5">
+            <a:extLst>
+              <a:ext uri="{FF2B5EF4-FFF2-40B4-BE49-F238E27FC236}">
+                <a16:creationId xmlns:a16="http://schemas.microsoft.com/office/drawing/2014/main" id="{E8169C9E-B9DA-D067-7005-ACEC8A30A850}"/>
+              </a:ext>
+            </a:extLst>
+          </p:cNvPr>
+          <p:cNvSpPr>
+            <a:spLocks noGrp="1"/>
+          </p:cNvSpPr>
+          <p:nvPr>
+            <p:ph type="title"/>
+          </p:nvPr>
+        </p:nvSpPr>
+        <p:spPr>
+          <a:xfrm>
+            <a:off x="4544661" y="2954762"/>
+            <a:ext cx="10515600" cy="1325563"/>
+          </a:xfrm>
+        </p:spPr>
+        <p:txBody>
+          <a:bodyPr/>
+          <a:lstStyle/>
+          <a:p>
+            <a:r>
+              <a:rPr lang="en-US" altLang="ko-KR" dirty="0"/>
+              <a:t> Thank You </a:t>
+            </a:r>
+            <a:endParaRPr lang="ko-KR" altLang="en-US" dirty="0"/>
+          </a:p>
+        </p:txBody>
+      </p:sp>
+    </p:spTree>
+    <p:extLst>
+      <p:ext uri="{BB962C8B-B14F-4D97-AF65-F5344CB8AC3E}">
+        <p14:creationId xmlns:p14="http://schemas.microsoft.com/office/powerpoint/2010/main" val="2623935272"/>
+      </p:ext>
+    </p:extLst>
+  </p:cSld>
+  <p:clrMapOvr>
+    <a:masterClrMapping/>
+  </p:clrMapOvr>
+</p:sld>
+</file>
+
 <file path=ppt/theme/theme1.xml><?xml version="1.0" encoding="utf-8"?>
 <a:theme xmlns:a="http://schemas.openxmlformats.org/drawingml/2006/main" name="Office Theme">
   <a:themeElements>

</xml_diff>